<commit_message>
Update activation docs and images
</commit_message>
<xml_diff>
--- a/docs/resources/activation/ActivationFlow.pptx
+++ b/docs/resources/activation/ActivationFlow.pptx
@@ -245,7 +245,7 @@
           <a:p>
             <a:fld id="{94258327-1D85-4D4E-873B-2CD5634CF0A6}" type="datetimeFigureOut">
               <a:rPr lang="en-US" smtClean="0"/>
-              <a:t>5/14/2019</a:t>
+              <a:t>5/16/2019</a:t>
             </a:fld>
             <a:endParaRPr lang="en-US"/>
           </a:p>
@@ -415,7 +415,7 @@
           <a:p>
             <a:fld id="{94258327-1D85-4D4E-873B-2CD5634CF0A6}" type="datetimeFigureOut">
               <a:rPr lang="en-US" smtClean="0"/>
-              <a:t>5/14/2019</a:t>
+              <a:t>5/16/2019</a:t>
             </a:fld>
             <a:endParaRPr lang="en-US"/>
           </a:p>
@@ -595,7 +595,7 @@
           <a:p>
             <a:fld id="{94258327-1D85-4D4E-873B-2CD5634CF0A6}" type="datetimeFigureOut">
               <a:rPr lang="en-US" smtClean="0"/>
-              <a:t>5/14/2019</a:t>
+              <a:t>5/16/2019</a:t>
             </a:fld>
             <a:endParaRPr lang="en-US"/>
           </a:p>
@@ -765,7 +765,7 @@
           <a:p>
             <a:fld id="{94258327-1D85-4D4E-873B-2CD5634CF0A6}" type="datetimeFigureOut">
               <a:rPr lang="en-US" smtClean="0"/>
-              <a:t>5/14/2019</a:t>
+              <a:t>5/16/2019</a:t>
             </a:fld>
             <a:endParaRPr lang="en-US"/>
           </a:p>
@@ -1009,7 +1009,7 @@
           <a:p>
             <a:fld id="{94258327-1D85-4D4E-873B-2CD5634CF0A6}" type="datetimeFigureOut">
               <a:rPr lang="en-US" smtClean="0"/>
-              <a:t>5/14/2019</a:t>
+              <a:t>5/16/2019</a:t>
             </a:fld>
             <a:endParaRPr lang="en-US"/>
           </a:p>
@@ -1241,7 +1241,7 @@
           <a:p>
             <a:fld id="{94258327-1D85-4D4E-873B-2CD5634CF0A6}" type="datetimeFigureOut">
               <a:rPr lang="en-US" smtClean="0"/>
-              <a:t>5/14/2019</a:t>
+              <a:t>5/16/2019</a:t>
             </a:fld>
             <a:endParaRPr lang="en-US"/>
           </a:p>
@@ -1608,7 +1608,7 @@
           <a:p>
             <a:fld id="{94258327-1D85-4D4E-873B-2CD5634CF0A6}" type="datetimeFigureOut">
               <a:rPr lang="en-US" smtClean="0"/>
-              <a:t>5/14/2019</a:t>
+              <a:t>5/16/2019</a:t>
             </a:fld>
             <a:endParaRPr lang="en-US"/>
           </a:p>
@@ -1726,7 +1726,7 @@
           <a:p>
             <a:fld id="{94258327-1D85-4D4E-873B-2CD5634CF0A6}" type="datetimeFigureOut">
               <a:rPr lang="en-US" smtClean="0"/>
-              <a:t>5/14/2019</a:t>
+              <a:t>5/16/2019</a:t>
             </a:fld>
             <a:endParaRPr lang="en-US"/>
           </a:p>
@@ -1821,7 +1821,7 @@
           <a:p>
             <a:fld id="{94258327-1D85-4D4E-873B-2CD5634CF0A6}" type="datetimeFigureOut">
               <a:rPr lang="en-US" smtClean="0"/>
-              <a:t>5/14/2019</a:t>
+              <a:t>5/16/2019</a:t>
             </a:fld>
             <a:endParaRPr lang="en-US"/>
           </a:p>
@@ -2098,7 +2098,7 @@
           <a:p>
             <a:fld id="{94258327-1D85-4D4E-873B-2CD5634CF0A6}" type="datetimeFigureOut">
               <a:rPr lang="en-US" smtClean="0"/>
-              <a:t>5/14/2019</a:t>
+              <a:t>5/16/2019</a:t>
             </a:fld>
             <a:endParaRPr lang="en-US"/>
           </a:p>
@@ -2355,7 +2355,7 @@
           <a:p>
             <a:fld id="{94258327-1D85-4D4E-873B-2CD5634CF0A6}" type="datetimeFigureOut">
               <a:rPr lang="en-US" smtClean="0"/>
-              <a:t>5/14/2019</a:t>
+              <a:t>5/16/2019</a:t>
             </a:fld>
             <a:endParaRPr lang="en-US"/>
           </a:p>
@@ -2568,7 +2568,7 @@
           <a:p>
             <a:fld id="{94258327-1D85-4D4E-873B-2CD5634CF0A6}" type="datetimeFigureOut">
               <a:rPr lang="en-US" smtClean="0"/>
-              <a:t>5/14/2019</a:t>
+              <a:t>5/16/2019</a:t>
             </a:fld>
             <a:endParaRPr lang="en-US"/>
           </a:p>
@@ -4281,8 +4281,8 @@
         </p:nvSpPr>
         <p:spPr>
           <a:xfrm>
-            <a:off x="3426288" y="1557576"/>
-            <a:ext cx="521297" cy="338554"/>
+            <a:off x="3396792" y="1557576"/>
+            <a:ext cx="633507" cy="338554"/>
           </a:xfrm>
           <a:prstGeom prst="rect">
             <a:avLst/>
@@ -4304,7 +4304,7 @@
                 </a:solidFill>
                 <a:latin typeface="Consolas" panose="020B0609020204030204" pitchFamily="49" charset="0"/>
               </a:rPr>
-              <a:t>yes</a:t>
+              <a:t>true</a:t>
             </a:r>
             <a:endParaRPr lang="en-US" sz="1600" b="1" dirty="0">
               <a:solidFill>
@@ -4332,7 +4332,7 @@
         <p:spPr>
           <a:xfrm>
             <a:off x="3391986" y="8319902"/>
-            <a:ext cx="521297" cy="338554"/>
+            <a:ext cx="633507" cy="338554"/>
           </a:xfrm>
           <a:prstGeom prst="rect">
             <a:avLst/>
@@ -4354,7 +4354,7 @@
                 </a:solidFill>
                 <a:latin typeface="Consolas" panose="020B0609020204030204" pitchFamily="49" charset="0"/>
               </a:rPr>
-              <a:t>yes</a:t>
+              <a:t>true</a:t>
             </a:r>
             <a:endParaRPr lang="en-US" sz="1600" b="1" dirty="0">
               <a:solidFill>
@@ -4501,8 +4501,8 @@
         </p:nvSpPr>
         <p:spPr>
           <a:xfrm>
-            <a:off x="4811837" y="342190"/>
-            <a:ext cx="409086" cy="338554"/>
+            <a:off x="4708601" y="342190"/>
+            <a:ext cx="745717" cy="338554"/>
           </a:xfrm>
           <a:prstGeom prst="rect">
             <a:avLst/>
@@ -4524,7 +4524,7 @@
                 </a:solidFill>
                 <a:latin typeface="Consolas" panose="020B0609020204030204" pitchFamily="49" charset="0"/>
               </a:rPr>
-              <a:t>no</a:t>
+              <a:t>false</a:t>
             </a:r>
             <a:endParaRPr lang="en-US" sz="1600" b="1" dirty="0">
               <a:solidFill>
@@ -4569,155 +4569,6 @@
       </p:grpSpPr>
       <p:sp>
         <p:nvSpPr>
-          <p:cNvPr id="4" name="Diamond 3">
-            <a:extLst>
-              <a:ext uri="{FF2B5EF4-FFF2-40B4-BE49-F238E27FC236}">
-                <a16:creationId xmlns:a16="http://schemas.microsoft.com/office/drawing/2014/main" id="{E3C714A3-D376-4DE0-9127-4C49C50558B6}"/>
-              </a:ext>
-            </a:extLst>
-          </p:cNvPr>
-          <p:cNvSpPr/>
-          <p:nvPr/>
-        </p:nvSpPr>
-        <p:spPr>
-          <a:xfrm>
-            <a:off x="2119208" y="2725883"/>
-            <a:ext cx="3424742" cy="1218081"/>
-          </a:xfrm>
-          <a:prstGeom prst="diamond">
-            <a:avLst/>
-          </a:prstGeom>
-          <a:solidFill>
-            <a:schemeClr val="accent1">
-              <a:lumMod val="20000"/>
-              <a:lumOff val="80000"/>
-            </a:schemeClr>
-          </a:solidFill>
-        </p:spPr>
-        <p:style>
-          <a:lnRef idx="2">
-            <a:schemeClr val="accent1">
-              <a:shade val="50000"/>
-            </a:schemeClr>
-          </a:lnRef>
-          <a:fillRef idx="1">
-            <a:schemeClr val="accent1"/>
-          </a:fillRef>
-          <a:effectRef idx="0">
-            <a:schemeClr val="accent1"/>
-          </a:effectRef>
-          <a:fontRef idx="minor">
-            <a:schemeClr val="lt1"/>
-          </a:fontRef>
-        </p:style>
-        <p:txBody>
-          <a:bodyPr rtlCol="0" anchor="ctr"/>
-          <a:lstStyle/>
-          <a:p>
-            <a:pPr algn="ctr"/>
-            <a:endParaRPr lang="en-US" sz="1200" dirty="0">
-              <a:latin typeface="Consolas" panose="020B0609020204030204" pitchFamily="49" charset="0"/>
-            </a:endParaRPr>
-          </a:p>
-        </p:txBody>
-      </p:sp>
-      <p:sp>
-        <p:nvSpPr>
-          <p:cNvPr id="5" name="TextBox 4">
-            <a:extLst>
-              <a:ext uri="{FF2B5EF4-FFF2-40B4-BE49-F238E27FC236}">
-                <a16:creationId xmlns:a16="http://schemas.microsoft.com/office/drawing/2014/main" id="{BA7CE563-69B4-44E5-BC11-93A995A8998A}"/>
-              </a:ext>
-            </a:extLst>
-          </p:cNvPr>
-          <p:cNvSpPr txBox="1"/>
-          <p:nvPr/>
-        </p:nvSpPr>
-        <p:spPr>
-          <a:xfrm>
-            <a:off x="2295414" y="3058702"/>
-            <a:ext cx="3072299" cy="523220"/>
-          </a:xfrm>
-          <a:prstGeom prst="rect">
-            <a:avLst/>
-          </a:prstGeom>
-          <a:noFill/>
-        </p:spPr>
-        <p:txBody>
-          <a:bodyPr wrap="square" rtlCol="0">
-            <a:spAutoFit/>
-          </a:bodyPr>
-          <a:lstStyle/>
-          <a:p>
-            <a:pPr algn="ctr"/>
-            <a:r>
-              <a:rPr lang="es-ES" sz="1400" b="1" dirty="0" err="1">
-                <a:solidFill>
-                  <a:schemeClr val="accent1">
-                    <a:lumMod val="50000"/>
-                  </a:schemeClr>
-                </a:solidFill>
-                <a:latin typeface="Consolas" panose="020B0609020204030204" pitchFamily="49" charset="0"/>
-              </a:rPr>
-              <a:t>activationHandler</a:t>
-            </a:r>
-            <a:endParaRPr lang="es-ES" sz="1400" b="1" dirty="0">
-              <a:solidFill>
-                <a:schemeClr val="accent1">
-                  <a:lumMod val="50000"/>
-                </a:schemeClr>
-              </a:solidFill>
-              <a:latin typeface="Consolas" panose="020B0609020204030204" pitchFamily="49" charset="0"/>
-            </a:endParaRPr>
-          </a:p>
-          <a:p>
-            <a:pPr algn="ctr"/>
-            <a:r>
-              <a:rPr lang="es-ES" sz="1400" b="1" dirty="0" err="1">
-                <a:solidFill>
-                  <a:schemeClr val="accent1">
-                    <a:lumMod val="50000"/>
-                  </a:schemeClr>
-                </a:solidFill>
-                <a:latin typeface="Consolas" panose="020B0609020204030204" pitchFamily="49" charset="0"/>
-              </a:rPr>
-              <a:t>not</a:t>
-            </a:r>
-            <a:r>
-              <a:rPr lang="es-ES" sz="1400" b="1" dirty="0">
-                <a:solidFill>
-                  <a:schemeClr val="accent1">
-                    <a:lumMod val="50000"/>
-                  </a:schemeClr>
-                </a:solidFill>
-                <a:latin typeface="Consolas" panose="020B0609020204030204" pitchFamily="49" charset="0"/>
-              </a:rPr>
-              <a:t> </a:t>
-            </a:r>
-            <a:r>
-              <a:rPr lang="es-ES" sz="1400" b="1" dirty="0" err="1">
-                <a:solidFill>
-                  <a:schemeClr val="accent1">
-                    <a:lumMod val="50000"/>
-                  </a:schemeClr>
-                </a:solidFill>
-                <a:latin typeface="Consolas" panose="020B0609020204030204" pitchFamily="49" charset="0"/>
-              </a:rPr>
-              <a:t>null</a:t>
-            </a:r>
-            <a:endParaRPr lang="en-US" sz="1400" b="1" dirty="0">
-              <a:solidFill>
-                <a:schemeClr val="accent1">
-                  <a:lumMod val="50000"/>
-                </a:schemeClr>
-              </a:solidFill>
-              <a:latin typeface="Consolas" panose="020B0609020204030204" pitchFamily="49" charset="0"/>
-            </a:endParaRPr>
-          </a:p>
-        </p:txBody>
-      </p:sp>
-      <p:sp>
-        <p:nvSpPr>
           <p:cNvPr id="6" name="Rectangle: Rounded Corners 5">
             <a:extLst>
               <a:ext uri="{FF2B5EF4-FFF2-40B4-BE49-F238E27FC236}">
@@ -4795,6 +4646,28 @@
                 </a:solidFill>
                 <a:latin typeface="Consolas" panose="020B0609020204030204" pitchFamily="49" charset="0"/>
               </a:rPr>
+              <a:t>first</a:t>
+            </a:r>
+            <a:r>
+              <a:rPr lang="es-ES" sz="1400" b="1" dirty="0">
+                <a:solidFill>
+                  <a:schemeClr val="accent1">
+                    <a:lumMod val="50000"/>
+                  </a:schemeClr>
+                </a:solidFill>
+                <a:latin typeface="Consolas" panose="020B0609020204030204" pitchFamily="49" charset="0"/>
+              </a:rPr>
+              <a:t> </a:t>
+            </a:r>
+            <a:r>
+              <a:rPr lang="es-ES" sz="1400" b="1" dirty="0" err="1">
+                <a:solidFill>
+                  <a:schemeClr val="accent1">
+                    <a:lumMod val="50000"/>
+                  </a:schemeClr>
+                </a:solidFill>
+                <a:latin typeface="Consolas" panose="020B0609020204030204" pitchFamily="49" charset="0"/>
+              </a:rPr>
               <a:t>activationHandler</a:t>
             </a:r>
             <a:endParaRPr lang="es-ES" sz="1400" b="1" dirty="0">
@@ -4809,7 +4682,7 @@
           <a:p>
             <a:pPr algn="ctr"/>
             <a:r>
-              <a:rPr lang="es-ES" sz="1400" b="1" dirty="0">
+              <a:rPr lang="es-ES" sz="1400" b="1" dirty="0" err="1">
                 <a:solidFill>
                   <a:schemeClr val="accent1">
                     <a:lumMod val="50000"/>
@@ -4817,10 +4690,10 @@
                 </a:solidFill>
                 <a:latin typeface="Consolas" panose="020B0609020204030204" pitchFamily="49" charset="0"/>
               </a:rPr>
-              <a:t>as </a:t>
-            </a:r>
-            <a:r>
-              <a:rPr lang="es-ES" sz="1400" b="1" dirty="0" err="1">
+              <a:t>That</a:t>
+            </a:r>
+            <a:r>
+              <a:rPr lang="es-ES" sz="1400" b="1" dirty="0">
                 <a:solidFill>
                   <a:schemeClr val="accent1">
                     <a:lumMod val="50000"/>
@@ -4828,19 +4701,8 @@
                 </a:solidFill>
                 <a:latin typeface="Consolas" panose="020B0609020204030204" pitchFamily="49" charset="0"/>
               </a:rPr>
-              <a:t>FirstOrDefault</a:t>
-            </a:r>
-            <a:endParaRPr lang="es-ES" sz="1400" b="1" dirty="0">
-              <a:solidFill>
-                <a:schemeClr val="accent1">
-                  <a:lumMod val="50000"/>
-                </a:schemeClr>
-              </a:solidFill>
-              <a:latin typeface="Consolas" panose="020B0609020204030204" pitchFamily="49" charset="0"/>
-            </a:endParaRPr>
-          </a:p>
-          <a:p>
-            <a:pPr algn="ctr"/>
+              <a:t> </a:t>
+            </a:r>
             <a:r>
               <a:rPr lang="es-ES" sz="1400" b="1" dirty="0" err="1">
                 <a:solidFill>
@@ -4872,29 +4734,7 @@
                 </a:solidFill>
                 <a:latin typeface="Consolas" panose="020B0609020204030204" pitchFamily="49" charset="0"/>
               </a:rPr>
-              <a:t>activationArgs</a:t>
-            </a:r>
-            <a:endParaRPr lang="es-ES" sz="1400" b="1" dirty="0">
-              <a:solidFill>
-                <a:schemeClr val="accent1">
-                  <a:lumMod val="50000"/>
-                </a:schemeClr>
-              </a:solidFill>
-              <a:latin typeface="Consolas" panose="020B0609020204030204" pitchFamily="49" charset="0"/>
-            </a:endParaRPr>
-          </a:p>
-          <a:p>
-            <a:pPr algn="ctr"/>
-            <a:r>
-              <a:rPr lang="es-ES" sz="1400" b="1" dirty="0" err="1">
-                <a:solidFill>
-                  <a:schemeClr val="accent1">
-                    <a:lumMod val="50000"/>
-                  </a:schemeClr>
-                </a:solidFill>
-                <a:latin typeface="Consolas" panose="020B0609020204030204" pitchFamily="49" charset="0"/>
-              </a:rPr>
-              <a:t>from</a:t>
+              <a:t>current</a:t>
             </a:r>
             <a:r>
               <a:rPr lang="es-ES" sz="1400" b="1" dirty="0">
@@ -4916,7 +4756,29 @@
                 </a:solidFill>
                 <a:latin typeface="Consolas" panose="020B0609020204030204" pitchFamily="49" charset="0"/>
               </a:rPr>
-              <a:t>GetActivationHandlers</a:t>
+              <a:t>activation</a:t>
+            </a:r>
+            <a:r>
+              <a:rPr lang="es-ES" sz="1400" b="1" dirty="0">
+                <a:solidFill>
+                  <a:schemeClr val="accent1">
+                    <a:lumMod val="50000"/>
+                  </a:schemeClr>
+                </a:solidFill>
+                <a:latin typeface="Consolas" panose="020B0609020204030204" pitchFamily="49" charset="0"/>
+              </a:rPr>
+              <a:t> </a:t>
+            </a:r>
+            <a:r>
+              <a:rPr lang="es-ES" sz="1400" b="1" dirty="0" err="1">
+                <a:solidFill>
+                  <a:schemeClr val="accent1">
+                    <a:lumMod val="50000"/>
+                  </a:schemeClr>
+                </a:solidFill>
+                <a:latin typeface="Consolas" panose="020B0609020204030204" pitchFamily="49" charset="0"/>
+              </a:rPr>
+              <a:t>args</a:t>
             </a:r>
             <a:endParaRPr lang="en-US" sz="1400" b="1" dirty="0">
               <a:solidFill>
@@ -4941,14 +4803,14 @@
           <p:cNvCxnSpPr>
             <a:cxnSpLocks/>
             <a:stCxn id="6" idx="2"/>
-            <a:endCxn id="4" idx="0"/>
+            <a:endCxn id="18" idx="0"/>
           </p:cNvCxnSpPr>
           <p:nvPr/>
         </p:nvCxnSpPr>
         <p:spPr>
-          <a:xfrm>
-            <a:off x="3817532" y="2043364"/>
-            <a:ext cx="14047" cy="682519"/>
+          <a:xfrm flipH="1">
+            <a:off x="3817515" y="2043364"/>
+            <a:ext cx="17" cy="1270676"/>
           </a:xfrm>
           <a:prstGeom prst="straightConnector1">
             <a:avLst/>
@@ -4986,7 +4848,7 @@
         </p:nvSpPr>
         <p:spPr>
           <a:xfrm>
-            <a:off x="2105130" y="4432410"/>
+            <a:off x="2105129" y="3314040"/>
             <a:ext cx="3424771" cy="1007671"/>
           </a:xfrm>
           <a:prstGeom prst="roundRect">
@@ -5021,6 +4883,61 @@
           <a:p>
             <a:pPr algn="ctr"/>
             <a:r>
+              <a:rPr lang="es-ES" sz="1400" b="1" dirty="0">
+                <a:solidFill>
+                  <a:schemeClr val="accent1">
+                    <a:lumMod val="50000"/>
+                  </a:schemeClr>
+                </a:solidFill>
+                <a:latin typeface="Consolas" panose="020B0609020204030204" pitchFamily="49" charset="0"/>
+              </a:rPr>
+              <a:t>Run </a:t>
+            </a:r>
+            <a:r>
+              <a:rPr lang="es-ES" sz="1400" b="1" dirty="0" err="1">
+                <a:solidFill>
+                  <a:schemeClr val="accent1">
+                    <a:lumMod val="50000"/>
+                  </a:schemeClr>
+                </a:solidFill>
+                <a:latin typeface="Consolas" panose="020B0609020204030204" pitchFamily="49" charset="0"/>
+              </a:rPr>
+              <a:t>HandleAsync</a:t>
+            </a:r>
+            <a:r>
+              <a:rPr lang="es-ES" sz="1400" b="1" dirty="0">
+                <a:solidFill>
+                  <a:schemeClr val="accent1">
+                    <a:lumMod val="50000"/>
+                  </a:schemeClr>
+                </a:solidFill>
+                <a:latin typeface="Consolas" panose="020B0609020204030204" pitchFamily="49" charset="0"/>
+              </a:rPr>
+              <a:t> on </a:t>
+            </a:r>
+            <a:r>
+              <a:rPr lang="es-ES" sz="1400" b="1" dirty="0" err="1">
+                <a:solidFill>
+                  <a:schemeClr val="accent1">
+                    <a:lumMod val="50000"/>
+                  </a:schemeClr>
+                </a:solidFill>
+                <a:latin typeface="Consolas" panose="020B0609020204030204" pitchFamily="49" charset="0"/>
+              </a:rPr>
+              <a:t>selected</a:t>
+            </a:r>
+            <a:r>
+              <a:rPr lang="es-ES" sz="1400" b="1" dirty="0">
+                <a:solidFill>
+                  <a:schemeClr val="accent1">
+                    <a:lumMod val="50000"/>
+                  </a:schemeClr>
+                </a:solidFill>
+                <a:latin typeface="Consolas" panose="020B0609020204030204" pitchFamily="49" charset="0"/>
+              </a:rPr>
+              <a:t> </a:t>
+            </a:r>
+            <a:r>
               <a:rPr lang="es-ES" sz="1400" b="1" dirty="0" err="1">
                 <a:solidFill>
                   <a:schemeClr val="accent1">
@@ -5030,28 +4947,6 @@
                 <a:latin typeface="Consolas" panose="020B0609020204030204" pitchFamily="49" charset="0"/>
               </a:rPr>
               <a:t>activationHandler</a:t>
-            </a:r>
-            <a:r>
-              <a:rPr lang="es-ES" sz="1400" b="1" dirty="0">
-                <a:solidFill>
-                  <a:schemeClr val="accent1">
-                    <a:lumMod val="50000"/>
-                  </a:schemeClr>
-                </a:solidFill>
-                <a:latin typeface="Consolas" panose="020B0609020204030204" pitchFamily="49" charset="0"/>
-              </a:rPr>
-              <a:t> </a:t>
-            </a:r>
-            <a:r>
-              <a:rPr lang="es-ES" sz="1400" b="1" dirty="0" err="1">
-                <a:solidFill>
-                  <a:schemeClr val="accent1">
-                    <a:lumMod val="50000"/>
-                  </a:schemeClr>
-                </a:solidFill>
-                <a:latin typeface="Consolas" panose="020B0609020204030204" pitchFamily="49" charset="0"/>
-              </a:rPr>
-              <a:t>HandleAsync</a:t>
             </a:r>
             <a:endParaRPr lang="es-ES" sz="1400" b="1" dirty="0">
               <a:solidFill>
@@ -5064,49 +4959,6 @@
           </a:p>
         </p:txBody>
       </p:sp>
-      <p:cxnSp>
-        <p:nvCxnSpPr>
-          <p:cNvPr id="21" name="Straight Arrow Connector 20">
-            <a:extLst>
-              <a:ext uri="{FF2B5EF4-FFF2-40B4-BE49-F238E27FC236}">
-                <a16:creationId xmlns:a16="http://schemas.microsoft.com/office/drawing/2014/main" id="{34FFAF93-E5FB-4BA4-9C0C-36E1D250A41A}"/>
-              </a:ext>
-            </a:extLst>
-          </p:cNvPr>
-          <p:cNvCxnSpPr>
-            <a:cxnSpLocks/>
-            <a:stCxn id="4" idx="2"/>
-            <a:endCxn id="18" idx="0"/>
-          </p:cNvCxnSpPr>
-          <p:nvPr/>
-        </p:nvCxnSpPr>
-        <p:spPr>
-          <a:xfrm flipH="1">
-            <a:off x="3817516" y="3943964"/>
-            <a:ext cx="14063" cy="488446"/>
-          </a:xfrm>
-          <a:prstGeom prst="straightConnector1">
-            <a:avLst/>
-          </a:prstGeom>
-          <a:ln w="25400">
-            <a:tailEnd type="triangle"/>
-          </a:ln>
-        </p:spPr>
-        <p:style>
-          <a:lnRef idx="1">
-            <a:schemeClr val="accent1"/>
-          </a:lnRef>
-          <a:fillRef idx="0">
-            <a:schemeClr val="accent1"/>
-          </a:fillRef>
-          <a:effectRef idx="0">
-            <a:schemeClr val="accent1"/>
-          </a:effectRef>
-          <a:fontRef idx="minor">
-            <a:schemeClr val="tx1"/>
-          </a:fontRef>
-        </p:style>
-      </p:cxnSp>
       <p:cxnSp>
         <p:nvCxnSpPr>
           <p:cNvPr id="26" name="Straight Arrow Connector 25">
@@ -5124,9 +4976,9 @@
           <p:nvPr/>
         </p:nvCxnSpPr>
         <p:spPr>
-          <a:xfrm>
-            <a:off x="3817516" y="5440081"/>
-            <a:ext cx="2" cy="498340"/>
+          <a:xfrm flipH="1">
+            <a:off x="3816117" y="4321711"/>
+            <a:ext cx="1398" cy="646657"/>
           </a:xfrm>
           <a:prstGeom prst="straightConnector1">
             <a:avLst/>
@@ -5164,8 +5016,8 @@
         </p:nvSpPr>
         <p:spPr>
           <a:xfrm>
-            <a:off x="2105133" y="5938421"/>
-            <a:ext cx="3424770" cy="1218080"/>
+            <a:off x="2103732" y="4968368"/>
+            <a:ext cx="3424770" cy="1640038"/>
           </a:xfrm>
           <a:prstGeom prst="diamond">
             <a:avLst/>
@@ -5218,8 +5070,8 @@
         </p:nvSpPr>
         <p:spPr>
           <a:xfrm>
-            <a:off x="2204590" y="6396849"/>
-            <a:ext cx="3072299" cy="307777"/>
+            <a:off x="2204590" y="5571481"/>
+            <a:ext cx="3072299" cy="523220"/>
           </a:xfrm>
           <a:prstGeom prst="rect">
             <a:avLst/>
@@ -5244,46 +5096,6 @@
               </a:rPr>
               <a:t>IsInteractive</a:t>
             </a:r>
-            <a:endParaRPr lang="en-US" sz="1400" b="1" dirty="0">
-              <a:solidFill>
-                <a:schemeClr val="accent1">
-                  <a:lumMod val="50000"/>
-                </a:schemeClr>
-              </a:solidFill>
-              <a:latin typeface="Consolas" panose="020B0609020204030204" pitchFamily="49" charset="0"/>
-            </a:endParaRPr>
-          </a:p>
-        </p:txBody>
-      </p:sp>
-      <p:sp>
-        <p:nvSpPr>
-          <p:cNvPr id="62" name="TextBox 61">
-            <a:extLst>
-              <a:ext uri="{FF2B5EF4-FFF2-40B4-BE49-F238E27FC236}">
-                <a16:creationId xmlns:a16="http://schemas.microsoft.com/office/drawing/2014/main" id="{95DA4586-CCE3-445B-9EA4-781B7C752CB7}"/>
-              </a:ext>
-            </a:extLst>
-          </p:cNvPr>
-          <p:cNvSpPr txBox="1"/>
-          <p:nvPr/>
-        </p:nvSpPr>
-        <p:spPr>
-          <a:xfrm>
-            <a:off x="3817516" y="4003134"/>
-            <a:ext cx="604986" cy="307777"/>
-          </a:xfrm>
-          <a:prstGeom prst="rect">
-            <a:avLst/>
-          </a:prstGeom>
-          <a:noFill/>
-        </p:spPr>
-        <p:txBody>
-          <a:bodyPr wrap="square" rtlCol="0">
-            <a:spAutoFit/>
-          </a:bodyPr>
-          <a:lstStyle/>
-          <a:p>
-            <a:pPr algn="ctr"/>
             <a:r>
               <a:rPr lang="es-ES" sz="1400" b="1" dirty="0">
                 <a:solidFill>
@@ -5293,7 +5105,106 @@
                 </a:solidFill>
                 <a:latin typeface="Consolas" panose="020B0609020204030204" pitchFamily="49" charset="0"/>
               </a:rPr>
-              <a:t>yes</a:t>
+              <a:t> and </a:t>
+            </a:r>
+            <a:r>
+              <a:rPr lang="es-ES" sz="1400" b="1" dirty="0" err="1">
+                <a:solidFill>
+                  <a:schemeClr val="accent1">
+                    <a:lumMod val="50000"/>
+                  </a:schemeClr>
+                </a:solidFill>
+                <a:latin typeface="Consolas" panose="020B0609020204030204" pitchFamily="49" charset="0"/>
+              </a:rPr>
+              <a:t>current</a:t>
+            </a:r>
+            <a:r>
+              <a:rPr lang="es-ES" sz="1400" b="1" dirty="0">
+                <a:solidFill>
+                  <a:schemeClr val="accent1">
+                    <a:lumMod val="50000"/>
+                  </a:schemeClr>
+                </a:solidFill>
+                <a:latin typeface="Consolas" panose="020B0609020204030204" pitchFamily="49" charset="0"/>
+              </a:rPr>
+              <a:t> </a:t>
+            </a:r>
+            <a:r>
+              <a:rPr lang="es-ES" sz="1400" b="1" dirty="0" err="1">
+                <a:solidFill>
+                  <a:schemeClr val="accent1">
+                    <a:lumMod val="50000"/>
+                  </a:schemeClr>
+                </a:solidFill>
+                <a:latin typeface="Consolas" panose="020B0609020204030204" pitchFamily="49" charset="0"/>
+              </a:rPr>
+              <a:t>window</a:t>
+            </a:r>
+            <a:r>
+              <a:rPr lang="es-ES" sz="1400" b="1" dirty="0">
+                <a:solidFill>
+                  <a:schemeClr val="accent1">
+                    <a:lumMod val="50000"/>
+                  </a:schemeClr>
+                </a:solidFill>
+                <a:latin typeface="Consolas" panose="020B0609020204030204" pitchFamily="49" charset="0"/>
+              </a:rPr>
+              <a:t> </a:t>
+            </a:r>
+            <a:r>
+              <a:rPr lang="es-ES" sz="1400" b="1" dirty="0" err="1">
+                <a:solidFill>
+                  <a:schemeClr val="accent1">
+                    <a:lumMod val="50000"/>
+                  </a:schemeClr>
+                </a:solidFill>
+                <a:latin typeface="Consolas" panose="020B0609020204030204" pitchFamily="49" charset="0"/>
+              </a:rPr>
+              <a:t>content</a:t>
+            </a:r>
+            <a:r>
+              <a:rPr lang="es-ES" sz="1400" b="1" dirty="0">
+                <a:solidFill>
+                  <a:schemeClr val="accent1">
+                    <a:lumMod val="50000"/>
+                  </a:schemeClr>
+                </a:solidFill>
+                <a:latin typeface="Consolas" panose="020B0609020204030204" pitchFamily="49" charset="0"/>
+              </a:rPr>
+              <a:t> </a:t>
+            </a:r>
+            <a:r>
+              <a:rPr lang="es-ES" sz="1400" b="1" dirty="0" err="1">
+                <a:solidFill>
+                  <a:schemeClr val="accent1">
+                    <a:lumMod val="50000"/>
+                  </a:schemeClr>
+                </a:solidFill>
+                <a:latin typeface="Consolas" panose="020B0609020204030204" pitchFamily="49" charset="0"/>
+              </a:rPr>
+              <a:t>is</a:t>
+            </a:r>
+            <a:r>
+              <a:rPr lang="es-ES" sz="1400" b="1" dirty="0">
+                <a:solidFill>
+                  <a:schemeClr val="accent1">
+                    <a:lumMod val="50000"/>
+                  </a:schemeClr>
+                </a:solidFill>
+                <a:latin typeface="Consolas" panose="020B0609020204030204" pitchFamily="49" charset="0"/>
+              </a:rPr>
+              <a:t> </a:t>
+            </a:r>
+            <a:r>
+              <a:rPr lang="es-ES" sz="1400" b="1" dirty="0" err="1">
+                <a:solidFill>
+                  <a:schemeClr val="accent1">
+                    <a:lumMod val="50000"/>
+                  </a:schemeClr>
+                </a:solidFill>
+                <a:latin typeface="Consolas" panose="020B0609020204030204" pitchFamily="49" charset="0"/>
+              </a:rPr>
+              <a:t>null</a:t>
             </a:r>
             <a:endParaRPr lang="en-US" sz="1400" b="1" dirty="0">
               <a:solidFill>
@@ -5363,7 +5274,7 @@
                 </a:solidFill>
                 <a:latin typeface="Consolas" panose="020B0609020204030204" pitchFamily="49" charset="0"/>
               </a:rPr>
-              <a:t>defaultHandler</a:t>
+              <a:t>DefaultActivationHandler</a:t>
             </a:r>
             <a:r>
               <a:rPr lang="es-ES" sz="1400" b="1" dirty="0">
@@ -5374,11 +5285,8 @@
                 </a:solidFill>
                 <a:latin typeface="Consolas" panose="020B0609020204030204" pitchFamily="49" charset="0"/>
               </a:rPr>
-              <a:t> as new</a:t>
-            </a:r>
-          </a:p>
-          <a:p>
-            <a:pPr algn="ctr"/>
+              <a:t> </a:t>
+            </a:r>
             <a:r>
               <a:rPr lang="es-ES" sz="1400" b="1" dirty="0" err="1">
                 <a:solidFill>
@@ -5388,7 +5296,7 @@
                 </a:solidFill>
                 <a:latin typeface="Consolas" panose="020B0609020204030204" pitchFamily="49" charset="0"/>
               </a:rPr>
-              <a:t>DefaultActivationHandler</a:t>
+              <a:t>HandleAsync</a:t>
             </a:r>
             <a:endParaRPr lang="es-ES" sz="1400" b="1" dirty="0">
               <a:solidFill>
@@ -5419,313 +5327,8 @@
         </p:nvCxnSpPr>
         <p:spPr>
           <a:xfrm>
-            <a:off x="3817518" y="7156501"/>
-            <a:ext cx="0" cy="451228"/>
-          </a:xfrm>
-          <a:prstGeom prst="straightConnector1">
-            <a:avLst/>
-          </a:prstGeom>
-          <a:ln w="25400">
-            <a:tailEnd type="triangle"/>
-          </a:ln>
-        </p:spPr>
-        <p:style>
-          <a:lnRef idx="1">
-            <a:schemeClr val="accent1"/>
-          </a:lnRef>
-          <a:fillRef idx="0">
-            <a:schemeClr val="accent1"/>
-          </a:fillRef>
-          <a:effectRef idx="0">
-            <a:schemeClr val="accent1"/>
-          </a:effectRef>
-          <a:fontRef idx="minor">
-            <a:schemeClr val="tx1"/>
-          </a:fontRef>
-        </p:style>
-      </p:cxnSp>
-      <p:sp>
-        <p:nvSpPr>
-          <p:cNvPr id="71" name="Diamond 70">
-            <a:extLst>
-              <a:ext uri="{FF2B5EF4-FFF2-40B4-BE49-F238E27FC236}">
-                <a16:creationId xmlns:a16="http://schemas.microsoft.com/office/drawing/2014/main" id="{DA7C7BC3-5D49-4075-BD65-5ADFA9939A2F}"/>
-              </a:ext>
-            </a:extLst>
-          </p:cNvPr>
-          <p:cNvSpPr/>
-          <p:nvPr/>
-        </p:nvSpPr>
-        <p:spPr>
-          <a:xfrm>
-            <a:off x="2105130" y="9090570"/>
-            <a:ext cx="3424772" cy="1259551"/>
-          </a:xfrm>
-          <a:prstGeom prst="diamond">
-            <a:avLst/>
-          </a:prstGeom>
-          <a:solidFill>
-            <a:schemeClr val="accent1">
-              <a:lumMod val="20000"/>
-              <a:lumOff val="80000"/>
-            </a:schemeClr>
-          </a:solidFill>
-        </p:spPr>
-        <p:style>
-          <a:lnRef idx="2">
-            <a:schemeClr val="accent1">
-              <a:shade val="50000"/>
-            </a:schemeClr>
-          </a:lnRef>
-          <a:fillRef idx="1">
-            <a:schemeClr val="accent1"/>
-          </a:fillRef>
-          <a:effectRef idx="0">
-            <a:schemeClr val="accent1"/>
-          </a:effectRef>
-          <a:fontRef idx="minor">
-            <a:schemeClr val="lt1"/>
-          </a:fontRef>
-        </p:style>
-        <p:txBody>
-          <a:bodyPr rtlCol="0" anchor="ctr"/>
-          <a:lstStyle/>
-          <a:p>
-            <a:pPr algn="ctr"/>
-            <a:endParaRPr lang="en-US" sz="1200" dirty="0">
-              <a:latin typeface="Consolas" panose="020B0609020204030204" pitchFamily="49" charset="0"/>
-            </a:endParaRPr>
-          </a:p>
-        </p:txBody>
-      </p:sp>
-      <p:sp>
-        <p:nvSpPr>
-          <p:cNvPr id="72" name="TextBox 71">
-            <a:extLst>
-              <a:ext uri="{FF2B5EF4-FFF2-40B4-BE49-F238E27FC236}">
-                <a16:creationId xmlns:a16="http://schemas.microsoft.com/office/drawing/2014/main" id="{CB1014B2-129A-4D0E-9197-9EE977245589}"/>
-              </a:ext>
-            </a:extLst>
-          </p:cNvPr>
-          <p:cNvSpPr txBox="1"/>
-          <p:nvPr/>
-        </p:nvSpPr>
-        <p:spPr>
-          <a:xfrm>
-            <a:off x="2632371" y="9457517"/>
-            <a:ext cx="2370290" cy="523220"/>
-          </a:xfrm>
-          <a:prstGeom prst="rect">
-            <a:avLst/>
-          </a:prstGeom>
-          <a:noFill/>
-        </p:spPr>
-        <p:txBody>
-          <a:bodyPr wrap="square" rtlCol="0">
-            <a:spAutoFit/>
-          </a:bodyPr>
-          <a:lstStyle/>
-          <a:p>
-            <a:pPr algn="ctr"/>
-            <a:r>
-              <a:rPr lang="es-ES" sz="1400" b="1" dirty="0" err="1">
-                <a:solidFill>
-                  <a:schemeClr val="accent1">
-                    <a:lumMod val="50000"/>
-                  </a:schemeClr>
-                </a:solidFill>
-                <a:latin typeface="Consolas" panose="020B0609020204030204" pitchFamily="49" charset="0"/>
-              </a:rPr>
-              <a:t>defaultHandler</a:t>
-            </a:r>
-            <a:r>
-              <a:rPr lang="es-ES" sz="1400" b="1" dirty="0">
-                <a:solidFill>
-                  <a:schemeClr val="accent1">
-                    <a:lumMod val="50000"/>
-                  </a:schemeClr>
-                </a:solidFill>
-                <a:latin typeface="Consolas" panose="020B0609020204030204" pitchFamily="49" charset="0"/>
-              </a:rPr>
-              <a:t> </a:t>
-            </a:r>
-            <a:r>
-              <a:rPr lang="es-ES" sz="1400" b="1" dirty="0" err="1">
-                <a:solidFill>
-                  <a:schemeClr val="accent1">
-                    <a:lumMod val="50000"/>
-                  </a:schemeClr>
-                </a:solidFill>
-                <a:latin typeface="Consolas" panose="020B0609020204030204" pitchFamily="49" charset="0"/>
-              </a:rPr>
-              <a:t>CanHandle</a:t>
-            </a:r>
-            <a:endParaRPr lang="en-US" sz="1400" b="1" dirty="0">
-              <a:solidFill>
-                <a:schemeClr val="accent1">
-                  <a:lumMod val="50000"/>
-                </a:schemeClr>
-              </a:solidFill>
-              <a:latin typeface="Consolas" panose="020B0609020204030204" pitchFamily="49" charset="0"/>
-            </a:endParaRPr>
-          </a:p>
-        </p:txBody>
-      </p:sp>
-      <p:cxnSp>
-        <p:nvCxnSpPr>
-          <p:cNvPr id="73" name="Straight Arrow Connector 72">
-            <a:extLst>
-              <a:ext uri="{FF2B5EF4-FFF2-40B4-BE49-F238E27FC236}">
-                <a16:creationId xmlns:a16="http://schemas.microsoft.com/office/drawing/2014/main" id="{497314F2-3109-4818-AD0A-C7BFEDE02C44}"/>
-              </a:ext>
-            </a:extLst>
-          </p:cNvPr>
-          <p:cNvCxnSpPr>
-            <a:cxnSpLocks/>
-            <a:stCxn id="65" idx="2"/>
-            <a:endCxn id="71" idx="0"/>
-          </p:cNvCxnSpPr>
-          <p:nvPr/>
-        </p:nvCxnSpPr>
-        <p:spPr>
-          <a:xfrm flipH="1">
-            <a:off x="3817516" y="8615400"/>
-            <a:ext cx="2" cy="475170"/>
-          </a:xfrm>
-          <a:prstGeom prst="straightConnector1">
-            <a:avLst/>
-          </a:prstGeom>
-          <a:ln w="25400">
-            <a:tailEnd type="triangle"/>
-          </a:ln>
-        </p:spPr>
-        <p:style>
-          <a:lnRef idx="1">
-            <a:schemeClr val="accent1"/>
-          </a:lnRef>
-          <a:fillRef idx="0">
-            <a:schemeClr val="accent1"/>
-          </a:fillRef>
-          <a:effectRef idx="0">
-            <a:schemeClr val="accent1"/>
-          </a:effectRef>
-          <a:fontRef idx="minor">
-            <a:schemeClr val="tx1"/>
-          </a:fontRef>
-        </p:style>
-      </p:cxnSp>
-      <p:sp>
-        <p:nvSpPr>
-          <p:cNvPr id="79" name="Rectangle: Rounded Corners 78">
-            <a:extLst>
-              <a:ext uri="{FF2B5EF4-FFF2-40B4-BE49-F238E27FC236}">
-                <a16:creationId xmlns:a16="http://schemas.microsoft.com/office/drawing/2014/main" id="{91DA0B26-801C-474B-BE19-C2B6DC0FDE56}"/>
-              </a:ext>
-            </a:extLst>
-          </p:cNvPr>
-          <p:cNvSpPr/>
-          <p:nvPr/>
-        </p:nvSpPr>
-        <p:spPr>
-          <a:xfrm>
-            <a:off x="2105131" y="10918906"/>
-            <a:ext cx="3424771" cy="1007671"/>
-          </a:xfrm>
-          <a:prstGeom prst="roundRect">
-            <a:avLst/>
-          </a:prstGeom>
-          <a:solidFill>
-            <a:schemeClr val="accent1">
-              <a:lumMod val="20000"/>
-              <a:lumOff val="80000"/>
-            </a:schemeClr>
-          </a:solidFill>
-        </p:spPr>
-        <p:style>
-          <a:lnRef idx="2">
-            <a:schemeClr val="accent1">
-              <a:shade val="50000"/>
-            </a:schemeClr>
-          </a:lnRef>
-          <a:fillRef idx="1">
-            <a:schemeClr val="accent1"/>
-          </a:fillRef>
-          <a:effectRef idx="0">
-            <a:schemeClr val="accent1"/>
-          </a:effectRef>
-          <a:fontRef idx="minor">
-            <a:schemeClr val="lt1"/>
-          </a:fontRef>
-        </p:style>
-        <p:txBody>
-          <a:bodyPr rtlCol="0" anchor="ctr"/>
-          <a:lstStyle/>
-          <a:p>
-            <a:pPr algn="ctr"/>
-            <a:r>
-              <a:rPr lang="es-ES" sz="1400" b="1" dirty="0" err="1">
-                <a:solidFill>
-                  <a:schemeClr val="accent1">
-                    <a:lumMod val="50000"/>
-                  </a:schemeClr>
-                </a:solidFill>
-                <a:latin typeface="Consolas" panose="020B0609020204030204" pitchFamily="49" charset="0"/>
-              </a:rPr>
-              <a:t>defaultHandler</a:t>
-            </a:r>
-            <a:r>
-              <a:rPr lang="es-ES" sz="1400" b="1" dirty="0">
-                <a:solidFill>
-                  <a:schemeClr val="accent1">
-                    <a:lumMod val="50000"/>
-                  </a:schemeClr>
-                </a:solidFill>
-                <a:latin typeface="Consolas" panose="020B0609020204030204" pitchFamily="49" charset="0"/>
-              </a:rPr>
-              <a:t> </a:t>
-            </a:r>
-            <a:r>
-              <a:rPr lang="es-ES" sz="1400" b="1" dirty="0" err="1">
-                <a:solidFill>
-                  <a:schemeClr val="accent1">
-                    <a:lumMod val="50000"/>
-                  </a:schemeClr>
-                </a:solidFill>
-                <a:latin typeface="Consolas" panose="020B0609020204030204" pitchFamily="49" charset="0"/>
-              </a:rPr>
-              <a:t>HandleAsync</a:t>
-            </a:r>
-            <a:endParaRPr lang="es-ES" sz="1400" b="1" dirty="0">
-              <a:solidFill>
-                <a:schemeClr val="accent1">
-                  <a:lumMod val="50000"/>
-                </a:schemeClr>
-              </a:solidFill>
-              <a:latin typeface="Consolas" panose="020B0609020204030204" pitchFamily="49" charset="0"/>
-            </a:endParaRPr>
-          </a:p>
-        </p:txBody>
-      </p:sp>
-      <p:cxnSp>
-        <p:nvCxnSpPr>
-          <p:cNvPr id="80" name="Straight Arrow Connector 79">
-            <a:extLst>
-              <a:ext uri="{FF2B5EF4-FFF2-40B4-BE49-F238E27FC236}">
-                <a16:creationId xmlns:a16="http://schemas.microsoft.com/office/drawing/2014/main" id="{9C453744-A880-4A62-8339-D71184A41C50}"/>
-              </a:ext>
-            </a:extLst>
-          </p:cNvPr>
-          <p:cNvCxnSpPr>
-            <a:cxnSpLocks/>
-            <a:stCxn id="71" idx="2"/>
-            <a:endCxn id="79" idx="0"/>
-          </p:cNvCxnSpPr>
-          <p:nvPr/>
-        </p:nvCxnSpPr>
-        <p:spPr>
-          <a:xfrm>
-            <a:off x="3817516" y="10350121"/>
-            <a:ext cx="1" cy="568785"/>
+            <a:off x="3816117" y="6608406"/>
+            <a:ext cx="1401" cy="999323"/>
           </a:xfrm>
           <a:prstGeom prst="straightConnector1">
             <a:avLst/>
@@ -5763,7 +5366,7 @@
         </p:nvSpPr>
         <p:spPr>
           <a:xfrm>
-            <a:off x="3817515" y="7122475"/>
+            <a:off x="3816117" y="6889211"/>
             <a:ext cx="604986" cy="307777"/>
           </a:xfrm>
           <a:prstGeom prst="rect">
@@ -5787,58 +5390,7 @@
                 </a:solidFill>
                 <a:latin typeface="Consolas" panose="020B0609020204030204" pitchFamily="49" charset="0"/>
               </a:rPr>
-              <a:t>yes</a:t>
-            </a:r>
-            <a:endParaRPr lang="en-US" sz="1400" b="1" dirty="0">
-              <a:solidFill>
-                <a:schemeClr val="accent1">
-                  <a:lumMod val="50000"/>
-                </a:schemeClr>
-              </a:solidFill>
-              <a:latin typeface="Consolas" panose="020B0609020204030204" pitchFamily="49" charset="0"/>
-            </a:endParaRPr>
-          </a:p>
-        </p:txBody>
-      </p:sp>
-      <p:sp>
-        <p:nvSpPr>
-          <p:cNvPr id="84" name="TextBox 83">
-            <a:extLst>
-              <a:ext uri="{FF2B5EF4-FFF2-40B4-BE49-F238E27FC236}">
-                <a16:creationId xmlns:a16="http://schemas.microsoft.com/office/drawing/2014/main" id="{5537D091-E515-4170-8C3D-71C635DA5245}"/>
-              </a:ext>
-            </a:extLst>
-          </p:cNvPr>
-          <p:cNvSpPr txBox="1"/>
-          <p:nvPr/>
-        </p:nvSpPr>
-        <p:spPr>
-          <a:xfrm>
-            <a:off x="3817516" y="10395581"/>
-            <a:ext cx="604986" cy="307777"/>
-          </a:xfrm>
-          <a:prstGeom prst="rect">
-            <a:avLst/>
-          </a:prstGeom>
-          <a:noFill/>
-        </p:spPr>
-        <p:txBody>
-          <a:bodyPr wrap="square" rtlCol="0">
-            <a:spAutoFit/>
-          </a:bodyPr>
-          <a:lstStyle/>
-          <a:p>
-            <a:pPr algn="ctr"/>
-            <a:r>
-              <a:rPr lang="es-ES" sz="1400" b="1" dirty="0">
-                <a:solidFill>
-                  <a:schemeClr val="accent1">
-                    <a:lumMod val="50000"/>
-                  </a:schemeClr>
-                </a:solidFill>
-                <a:latin typeface="Consolas" panose="020B0609020204030204" pitchFamily="49" charset="0"/>
-              </a:rPr>
-              <a:t>yes</a:t>
+              <a:t>true</a:t>
             </a:r>
             <a:endParaRPr lang="en-US" sz="1400" b="1" dirty="0">
               <a:solidFill>

</xml_diff>

<commit_message>
Updates on Suspend and resume doc and activation doc
</commit_message>
<xml_diff>
--- a/docs/resources/activation/ActivationFlow.pptx
+++ b/docs/resources/activation/ActivationFlow.pptx
@@ -2987,7 +2987,7 @@
         </p:nvSpPr>
         <p:spPr>
           <a:xfrm>
-            <a:off x="1034234" y="4975209"/>
+            <a:off x="734894" y="4975209"/>
             <a:ext cx="1447220" cy="845481"/>
           </a:xfrm>
           <a:prstGeom prst="roundRect">
@@ -3022,7 +3022,7 @@
           <a:p>
             <a:pPr algn="ctr"/>
             <a:r>
-              <a:rPr lang="es-ES" sz="800" b="1" dirty="0" err="1">
+              <a:rPr lang="es-ES" sz="1600" b="1" dirty="0" err="1">
                 <a:solidFill>
                   <a:schemeClr val="accent1">
                     <a:lumMod val="50000"/>
@@ -3032,7 +3032,7 @@
               </a:rPr>
               <a:t>OnLaunched</a:t>
             </a:r>
-            <a:endParaRPr lang="en-US" sz="800" b="1" dirty="0">
+            <a:endParaRPr lang="en-US" sz="1600" b="1" dirty="0">
               <a:solidFill>
                 <a:schemeClr val="accent1">
                   <a:lumMod val="50000"/>
@@ -3060,9 +3060,9 @@
           <p:nvPr/>
         </p:nvCxnSpPr>
         <p:spPr>
-          <a:xfrm>
-            <a:off x="3474678" y="5820689"/>
-            <a:ext cx="0" cy="908674"/>
+          <a:xfrm flipH="1">
+            <a:off x="3549650" y="5820690"/>
+            <a:ext cx="2357" cy="908675"/>
           </a:xfrm>
           <a:prstGeom prst="straightConnector1">
             <a:avLst/>
@@ -3100,8 +3100,8 @@
         </p:nvSpPr>
         <p:spPr>
           <a:xfrm>
-            <a:off x="2751068" y="4975209"/>
-            <a:ext cx="1447220" cy="845481"/>
+            <a:off x="2751067" y="4975209"/>
+            <a:ext cx="1601879" cy="845481"/>
           </a:xfrm>
           <a:prstGeom prst="roundRect">
             <a:avLst/>
@@ -3135,7 +3135,7 @@
           <a:p>
             <a:pPr algn="ctr"/>
             <a:r>
-              <a:rPr lang="es-ES" sz="800" b="1" dirty="0" err="1">
+              <a:rPr lang="es-ES" sz="1600" b="1" dirty="0" err="1">
                 <a:solidFill>
                   <a:schemeClr val="accent1">
                     <a:lumMod val="50000"/>
@@ -3145,7 +3145,7 @@
               </a:rPr>
               <a:t>OnActivated</a:t>
             </a:r>
-            <a:endParaRPr lang="en-US" sz="800" b="1" dirty="0">
+            <a:endParaRPr lang="en-US" sz="1600" b="1" dirty="0">
               <a:solidFill>
                 <a:schemeClr val="accent1">
                   <a:lumMod val="50000"/>
@@ -3170,8 +3170,8 @@
         </p:nvSpPr>
         <p:spPr>
           <a:xfrm>
-            <a:off x="4491715" y="4989642"/>
-            <a:ext cx="1447220" cy="845481"/>
+            <a:off x="4921899" y="4989642"/>
+            <a:ext cx="1601879" cy="845481"/>
           </a:xfrm>
           <a:prstGeom prst="roundRect">
             <a:avLst/>
@@ -3205,7 +3205,7 @@
           <a:p>
             <a:pPr algn="ctr"/>
             <a:r>
-              <a:rPr lang="es-ES" sz="800" b="1" dirty="0" err="1">
+              <a:rPr lang="es-ES" sz="1600" b="1" dirty="0" err="1">
                 <a:solidFill>
                   <a:schemeClr val="accent1">
                     <a:lumMod val="50000"/>
@@ -3215,7 +3215,7 @@
               </a:rPr>
               <a:t>OnBackgroundActivated</a:t>
             </a:r>
-            <a:endParaRPr lang="en-US" sz="800" b="1" dirty="0">
+            <a:endParaRPr lang="en-US" sz="1600" b="1" dirty="0">
               <a:solidFill>
                 <a:schemeClr val="accent1">
                   <a:lumMod val="50000"/>
@@ -3240,8 +3240,8 @@
         </p:nvSpPr>
         <p:spPr>
           <a:xfrm>
-            <a:off x="2751068" y="6729365"/>
-            <a:ext cx="1447220" cy="845481"/>
+            <a:off x="2425700" y="6729365"/>
+            <a:ext cx="2247899" cy="845481"/>
           </a:xfrm>
           <a:prstGeom prst="roundRect">
             <a:avLst/>
@@ -3275,7 +3275,7 @@
           <a:p>
             <a:pPr algn="ctr"/>
             <a:r>
-              <a:rPr lang="es-ES" sz="800" b="1" dirty="0" err="1">
+              <a:rPr lang="es-ES" sz="1600" b="1" dirty="0" err="1">
                 <a:solidFill>
                   <a:schemeClr val="accent1">
                     <a:lumMod val="50000"/>
@@ -3285,7 +3285,7 @@
               </a:rPr>
               <a:t>ActivationService</a:t>
             </a:r>
-            <a:endParaRPr lang="es-ES" sz="800" b="1" dirty="0">
+            <a:endParaRPr lang="es-ES" sz="1600" b="1" dirty="0">
               <a:solidFill>
                 <a:schemeClr val="accent1">
                   <a:lumMod val="50000"/>
@@ -3297,7 +3297,7 @@
           <a:p>
             <a:pPr algn="ctr"/>
             <a:r>
-              <a:rPr lang="es-ES" sz="800" b="1" dirty="0" err="1">
+              <a:rPr lang="es-ES" sz="1600" b="1" dirty="0" err="1">
                 <a:solidFill>
                   <a:schemeClr val="accent1">
                     <a:lumMod val="50000"/>
@@ -3307,7 +3307,7 @@
               </a:rPr>
               <a:t>ActivateAsync</a:t>
             </a:r>
-            <a:endParaRPr lang="en-US" sz="800" b="1" dirty="0">
+            <a:endParaRPr lang="en-US" sz="1600" b="1" dirty="0">
               <a:solidFill>
                 <a:schemeClr val="accent1">
                   <a:lumMod val="50000"/>
@@ -3335,7 +3335,7 @@
         </p:nvCxnSpPr>
         <p:spPr>
           <a:xfrm>
-            <a:off x="1757842" y="5820689"/>
+            <a:off x="1458502" y="5820689"/>
             <a:ext cx="0" cy="468770"/>
           </a:xfrm>
           <a:prstGeom prst="line">
@@ -3374,9 +3374,9 @@
           <p:nvPr/>
         </p:nvCxnSpPr>
         <p:spPr>
-          <a:xfrm flipH="1">
-            <a:off x="5212944" y="5835121"/>
-            <a:ext cx="2382" cy="463861"/>
+          <a:xfrm>
+            <a:off x="5722839" y="5835123"/>
+            <a:ext cx="0" cy="454335"/>
           </a:xfrm>
           <a:prstGeom prst="line">
             <a:avLst/>
@@ -3414,8 +3414,8 @@
         </p:nvCxnSpPr>
         <p:spPr>
           <a:xfrm flipH="1">
-            <a:off x="1754668" y="6289458"/>
-            <a:ext cx="3458284" cy="0"/>
+            <a:off x="1458502" y="6289458"/>
+            <a:ext cx="4264336" cy="0"/>
           </a:xfrm>
           <a:prstGeom prst="line">
             <a:avLst/>

</xml_diff>